<commit_message>
Update session 38 documents.
</commit_message>
<xml_diff>
--- a/CPSC-24700/Presentations/database.pptx
+++ b/CPSC-24700/Presentations/database.pptx
@@ -269,7 +269,7 @@
             <a:fld id="{82AC26F5-A2E7-4901-A403-BBD25C17198C}" type="datetimeFigureOut">
               <a:rPr lang="en-US" smtClean="0"/>
               <a:pPr/>
-              <a:t>11/29/2017</a:t>
+              <a:t>12/1/2017</a:t>
             </a:fld>
             <a:endParaRPr lang="en-US"/>
           </a:p>
@@ -1189,7 +1189,10 @@
           <a:bodyPr/>
           <a:lstStyle/>
           <a:p>
-            <a:endParaRPr lang="en-US"/>
+            <a:r>
+              <a:rPr lang="en-US" dirty="0"/>
+              <a:t>Not quite a three-tier in that a normal three-tier application would have the middle tier ONLY responsible for business logic.</a:t>
+            </a:r>
           </a:p>
         </p:txBody>
       </p:sp>
@@ -2179,7 +2182,7 @@
             <a:fld id="{FB7712AD-3B21-4FE9-B722-CF9B0200D9B9}" type="datetimeFigureOut">
               <a:rPr lang="en-US" smtClean="0"/>
               <a:pPr/>
-              <a:t>11/29/2017</a:t>
+              <a:t>12/1/2017</a:t>
             </a:fld>
             <a:endParaRPr lang="en-US"/>
           </a:p>
@@ -2448,7 +2451,7 @@
             <a:fld id="{FB7712AD-3B21-4FE9-B722-CF9B0200D9B9}" type="datetimeFigureOut">
               <a:rPr lang="en-US" smtClean="0"/>
               <a:pPr/>
-              <a:t>11/29/2017</a:t>
+              <a:t>12/1/2017</a:t>
             </a:fld>
             <a:endParaRPr lang="en-US"/>
           </a:p>
@@ -2630,7 +2633,7 @@
             <a:fld id="{FB7712AD-3B21-4FE9-B722-CF9B0200D9B9}" type="datetimeFigureOut">
               <a:rPr lang="en-US" smtClean="0"/>
               <a:pPr/>
-              <a:t>11/29/2017</a:t>
+              <a:t>12/1/2017</a:t>
             </a:fld>
             <a:endParaRPr lang="en-US"/>
           </a:p>
@@ -2822,7 +2825,7 @@
             <a:fld id="{FB7712AD-3B21-4FE9-B722-CF9B0200D9B9}" type="datetimeFigureOut">
               <a:rPr lang="en-US" smtClean="0"/>
               <a:pPr/>
-              <a:t>11/29/2017</a:t>
+              <a:t>12/1/2017</a:t>
             </a:fld>
             <a:endParaRPr lang="en-US"/>
           </a:p>
@@ -3000,7 +3003,7 @@
             <a:fld id="{A6BD6E06-0F29-43E3-9201-8686C612D655}" type="datetime1">
               <a:rPr lang="en-US" smtClean="0"/>
               <a:pPr/>
-              <a:t>11/29/2017</a:t>
+              <a:t>12/1/2017</a:t>
             </a:fld>
             <a:endParaRPr lang="en-US"/>
           </a:p>
@@ -3209,7 +3212,7 @@
           <a:p>
             <a:fld id="{5FB62F81-FD80-4AA8-93CA-E835B40BE667}" type="datetimeFigureOut">
               <a:rPr lang="en-US" smtClean="0"/>
-              <a:t>11/29/2017</a:t>
+              <a:t>12/1/2017</a:t>
             </a:fld>
             <a:endParaRPr lang="en-US"/>
           </a:p>
@@ -3407,7 +3410,7 @@
           <a:p>
             <a:fld id="{5FB62F81-FD80-4AA8-93CA-E835B40BE667}" type="datetimeFigureOut">
               <a:rPr lang="en-US" smtClean="0"/>
-              <a:t>11/29/2017</a:t>
+              <a:t>12/1/2017</a:t>
             </a:fld>
             <a:endParaRPr lang="en-US"/>
           </a:p>
@@ -3682,7 +3685,7 @@
           <a:p>
             <a:fld id="{5FB62F81-FD80-4AA8-93CA-E835B40BE667}" type="datetimeFigureOut">
               <a:rPr lang="en-US" smtClean="0"/>
-              <a:t>11/29/2017</a:t>
+              <a:t>12/1/2017</a:t>
             </a:fld>
             <a:endParaRPr lang="en-US"/>
           </a:p>
@@ -3947,7 +3950,7 @@
           <a:p>
             <a:fld id="{5FB62F81-FD80-4AA8-93CA-E835B40BE667}" type="datetimeFigureOut">
               <a:rPr lang="en-US" smtClean="0"/>
-              <a:t>11/29/2017</a:t>
+              <a:t>12/1/2017</a:t>
             </a:fld>
             <a:endParaRPr lang="en-US"/>
           </a:p>
@@ -4359,7 +4362,7 @@
           <a:p>
             <a:fld id="{5FB62F81-FD80-4AA8-93CA-E835B40BE667}" type="datetimeFigureOut">
               <a:rPr lang="en-US" smtClean="0"/>
-              <a:t>11/29/2017</a:t>
+              <a:t>12/1/2017</a:t>
             </a:fld>
             <a:endParaRPr lang="en-US"/>
           </a:p>
@@ -4500,7 +4503,7 @@
           <a:p>
             <a:fld id="{5FB62F81-FD80-4AA8-93CA-E835B40BE667}" type="datetimeFigureOut">
               <a:rPr lang="en-US" smtClean="0"/>
-              <a:t>11/29/2017</a:t>
+              <a:t>12/1/2017</a:t>
             </a:fld>
             <a:endParaRPr lang="en-US"/>
           </a:p>
@@ -4649,7 +4652,7 @@
             <a:fld id="{FB7712AD-3B21-4FE9-B722-CF9B0200D9B9}" type="datetimeFigureOut">
               <a:rPr lang="en-US" smtClean="0"/>
               <a:pPr/>
-              <a:t>11/29/2017</a:t>
+              <a:t>12/1/2017</a:t>
             </a:fld>
             <a:endParaRPr lang="en-US"/>
           </a:p>
@@ -4759,7 +4762,7 @@
           <a:p>
             <a:fld id="{5FB62F81-FD80-4AA8-93CA-E835B40BE667}" type="datetimeFigureOut">
               <a:rPr lang="en-US" smtClean="0"/>
-              <a:t>11/29/2017</a:t>
+              <a:t>12/1/2017</a:t>
             </a:fld>
             <a:endParaRPr lang="en-US"/>
           </a:p>
@@ -5070,7 +5073,7 @@
           <a:p>
             <a:fld id="{5FB62F81-FD80-4AA8-93CA-E835B40BE667}" type="datetimeFigureOut">
               <a:rPr lang="en-US" smtClean="0"/>
-              <a:t>11/29/2017</a:t>
+              <a:t>12/1/2017</a:t>
             </a:fld>
             <a:endParaRPr lang="en-US"/>
           </a:p>
@@ -5358,7 +5361,7 @@
           <a:p>
             <a:fld id="{5FB62F81-FD80-4AA8-93CA-E835B40BE667}" type="datetimeFigureOut">
               <a:rPr lang="en-US" smtClean="0"/>
-              <a:t>11/29/2017</a:t>
+              <a:t>12/1/2017</a:t>
             </a:fld>
             <a:endParaRPr lang="en-US"/>
           </a:p>
@@ -5556,7 +5559,7 @@
           <a:p>
             <a:fld id="{5FB62F81-FD80-4AA8-93CA-E835B40BE667}" type="datetimeFigureOut">
               <a:rPr lang="en-US" smtClean="0"/>
-              <a:t>11/29/2017</a:t>
+              <a:t>12/1/2017</a:t>
             </a:fld>
             <a:endParaRPr lang="en-US"/>
           </a:p>
@@ -5764,7 +5767,7 @@
           <a:p>
             <a:fld id="{5FB62F81-FD80-4AA8-93CA-E835B40BE667}" type="datetimeFigureOut">
               <a:rPr lang="en-US" smtClean="0"/>
-              <a:t>11/29/2017</a:t>
+              <a:t>12/1/2017</a:t>
             </a:fld>
             <a:endParaRPr lang="en-US"/>
           </a:p>
@@ -6007,7 +6010,7 @@
             <a:fld id="{FB7712AD-3B21-4FE9-B722-CF9B0200D9B9}" type="datetimeFigureOut">
               <a:rPr lang="en-US" smtClean="0"/>
               <a:pPr/>
-              <a:t>11/29/2017</a:t>
+              <a:t>12/1/2017</a:t>
             </a:fld>
             <a:endParaRPr lang="en-US"/>
           </a:p>
@@ -6594,7 +6597,7 @@
             <a:fld id="{FB7712AD-3B21-4FE9-B722-CF9B0200D9B9}" type="datetimeFigureOut">
               <a:rPr lang="en-US" smtClean="0"/>
               <a:pPr/>
-              <a:t>11/29/2017</a:t>
+              <a:t>12/1/2017</a:t>
             </a:fld>
             <a:endParaRPr lang="en-US"/>
           </a:p>
@@ -6893,7 +6896,7 @@
             <a:fld id="{FB7712AD-3B21-4FE9-B722-CF9B0200D9B9}" type="datetimeFigureOut">
               <a:rPr lang="en-US" smtClean="0"/>
               <a:pPr/>
-              <a:t>11/29/2017</a:t>
+              <a:t>12/1/2017</a:t>
             </a:fld>
             <a:endParaRPr lang="en-US"/>
           </a:p>
@@ -7331,7 +7334,7 @@
             <a:fld id="{FB7712AD-3B21-4FE9-B722-CF9B0200D9B9}" type="datetimeFigureOut">
               <a:rPr lang="en-US" smtClean="0"/>
               <a:pPr/>
-              <a:t>11/29/2017</a:t>
+              <a:t>12/1/2017</a:t>
             </a:fld>
             <a:endParaRPr lang="en-US"/>
           </a:p>
@@ -7462,7 +7465,7 @@
             <a:fld id="{FB7712AD-3B21-4FE9-B722-CF9B0200D9B9}" type="datetimeFigureOut">
               <a:rPr lang="en-US" smtClean="0"/>
               <a:pPr/>
-              <a:t>11/29/2017</a:t>
+              <a:t>12/1/2017</a:t>
             </a:fld>
             <a:endParaRPr lang="en-US"/>
           </a:p>
@@ -7571,7 +7574,7 @@
             <a:fld id="{FB7712AD-3B21-4FE9-B722-CF9B0200D9B9}" type="datetimeFigureOut">
               <a:rPr lang="en-US" smtClean="0"/>
               <a:pPr/>
-              <a:t>11/29/2017</a:t>
+              <a:t>12/1/2017</a:t>
             </a:fld>
             <a:endParaRPr lang="en-US"/>
           </a:p>
@@ -7860,7 +7863,7 @@
             <a:fld id="{FB7712AD-3B21-4FE9-B722-CF9B0200D9B9}" type="datetimeFigureOut">
               <a:rPr lang="en-US" smtClean="0"/>
               <a:pPr/>
-              <a:t>11/29/2017</a:t>
+              <a:t>12/1/2017</a:t>
             </a:fld>
             <a:endParaRPr lang="en-US"/>
           </a:p>
@@ -8188,7 +8191,7 @@
             <a:fld id="{FB7712AD-3B21-4FE9-B722-CF9B0200D9B9}" type="datetimeFigureOut">
               <a:rPr lang="en-US" smtClean="0"/>
               <a:pPr/>
-              <a:t>11/29/2017</a:t>
+              <a:t>12/1/2017</a:t>
             </a:fld>
             <a:endParaRPr lang="en-US"/>
           </a:p>
@@ -8890,7 +8893,7 @@
           <a:p>
             <a:fld id="{5FB62F81-FD80-4AA8-93CA-E835B40BE667}" type="datetimeFigureOut">
               <a:rPr lang="en-US" smtClean="0"/>
-              <a:t>11/29/2017</a:t>
+              <a:t>12/1/2017</a:t>
             </a:fld>
             <a:endParaRPr lang="en-US"/>
           </a:p>

</xml_diff>